<commit_message>
added screenshots of the code
</commit_message>
<xml_diff>
--- a/Rust workshop presentation.pptx
+++ b/Rust workshop presentation.pptx
@@ -214,7 +214,7 @@
           <a:p>
             <a:fld id="{59746C06-FCD2-4F71-B216-407952C80BC0}" type="datetimeFigureOut">
               <a:rPr lang="en-US" smtClean="0"/>
-              <a:t>10/21/2025</a:t>
+              <a:t>10/22/2025</a:t>
             </a:fld>
             <a:endParaRPr lang="en-US"/>
           </a:p>
@@ -2507,7 +2507,7 @@
           <a:p>
             <a:fld id="{7AE778D6-116B-42D4-B211-69FF968B1FB5}" type="datetime1">
               <a:rPr lang="en-US" smtClean="0"/>
-              <a:t>10/21/2025</a:t>
+              <a:t>10/22/2025</a:t>
             </a:fld>
             <a:endParaRPr lang="en-US"/>
           </a:p>
@@ -2705,7 +2705,7 @@
           <a:p>
             <a:fld id="{7E6DD9C0-0887-4597-9FA4-971B42BD2B7B}" type="datetime1">
               <a:rPr lang="en-US" smtClean="0"/>
-              <a:t>10/21/2025</a:t>
+              <a:t>10/22/2025</a:t>
             </a:fld>
             <a:endParaRPr lang="en-US"/>
           </a:p>
@@ -2913,7 +2913,7 @@
           <a:p>
             <a:fld id="{68CBAA00-04F6-4A64-8418-1CAF36238E74}" type="datetime1">
               <a:rPr lang="en-US" smtClean="0"/>
-              <a:t>10/21/2025</a:t>
+              <a:t>10/22/2025</a:t>
             </a:fld>
             <a:endParaRPr lang="en-US"/>
           </a:p>
@@ -3111,7 +3111,7 @@
           <a:p>
             <a:fld id="{A20B7C04-B98A-469A-A63D-29333B974FF0}" type="datetime1">
               <a:rPr lang="en-US" smtClean="0"/>
-              <a:t>10/21/2025</a:t>
+              <a:t>10/22/2025</a:t>
             </a:fld>
             <a:endParaRPr lang="en-US"/>
           </a:p>
@@ -3386,7 +3386,7 @@
           <a:p>
             <a:fld id="{D144AB39-089E-4DC2-9FD7-483334CC6F45}" type="datetime1">
               <a:rPr lang="en-US" smtClean="0"/>
-              <a:t>10/21/2025</a:t>
+              <a:t>10/22/2025</a:t>
             </a:fld>
             <a:endParaRPr lang="en-US"/>
           </a:p>
@@ -3651,7 +3651,7 @@
           <a:p>
             <a:fld id="{10FF1A6B-EBD6-486F-8482-790FCFEAC738}" type="datetime1">
               <a:rPr lang="en-US" smtClean="0"/>
-              <a:t>10/21/2025</a:t>
+              <a:t>10/22/2025</a:t>
             </a:fld>
             <a:endParaRPr lang="en-US"/>
           </a:p>
@@ -4063,7 +4063,7 @@
           <a:p>
             <a:fld id="{FB1891AC-55C6-4C05-A884-9CB1E0A310E6}" type="datetime1">
               <a:rPr lang="en-US" smtClean="0"/>
-              <a:t>10/21/2025</a:t>
+              <a:t>10/22/2025</a:t>
             </a:fld>
             <a:endParaRPr lang="en-US"/>
           </a:p>
@@ -4204,7 +4204,7 @@
           <a:p>
             <a:fld id="{DFDE8B63-F820-4FAD-81A2-E59676E7AC11}" type="datetime1">
               <a:rPr lang="en-US" smtClean="0"/>
-              <a:t>10/21/2025</a:t>
+              <a:t>10/22/2025</a:t>
             </a:fld>
             <a:endParaRPr lang="en-US"/>
           </a:p>
@@ -4317,7 +4317,7 @@
           <a:p>
             <a:fld id="{B16CBD63-D720-4FA5-9B2A-11A274B73B13}" type="datetime1">
               <a:rPr lang="en-US" smtClean="0"/>
-              <a:t>10/21/2025</a:t>
+              <a:t>10/22/2025</a:t>
             </a:fld>
             <a:endParaRPr lang="en-US"/>
           </a:p>
@@ -4628,7 +4628,7 @@
           <a:p>
             <a:fld id="{AE6DC516-42BC-4DA2-A67D-57F25C343610}" type="datetime1">
               <a:rPr lang="en-US" smtClean="0"/>
-              <a:t>10/21/2025</a:t>
+              <a:t>10/22/2025</a:t>
             </a:fld>
             <a:endParaRPr lang="en-US"/>
           </a:p>
@@ -4916,7 +4916,7 @@
           <a:p>
             <a:fld id="{057FCABE-86A5-44BB-A17E-3066E7620E0A}" type="datetime1">
               <a:rPr lang="en-US" smtClean="0"/>
-              <a:t>10/21/2025</a:t>
+              <a:t>10/22/2025</a:t>
             </a:fld>
             <a:endParaRPr lang="en-US"/>
           </a:p>
@@ -5157,7 +5157,7 @@
           <a:p>
             <a:fld id="{853198DE-BE31-40FF-B292-54C23C33BE6A}" type="datetime1">
               <a:rPr lang="en-US" smtClean="0"/>
-              <a:t>10/21/2025</a:t>
+              <a:t>10/22/2025</a:t>
             </a:fld>
             <a:endParaRPr lang="en-US"/>
           </a:p>
@@ -6293,6 +6293,98 @@
           </a:p>
         </p:txBody>
       </p:sp>
+      <p:pic>
+        <p:nvPicPr>
+          <p:cNvPr id="5" name="Picture 4">
+            <a:extLst>
+              <a:ext uri="{FF2B5EF4-FFF2-40B4-BE49-F238E27FC236}">
+                <a16:creationId xmlns:a16="http://schemas.microsoft.com/office/drawing/2014/main" id="{041FD411-C9FA-0F48-C8C8-EB2E5DEFECB7}"/>
+              </a:ext>
+            </a:extLst>
+          </p:cNvPr>
+          <p:cNvPicPr>
+            <a:picLocks noChangeAspect="1"/>
+          </p:cNvPicPr>
+          <p:nvPr/>
+        </p:nvPicPr>
+        <p:blipFill>
+          <a:blip r:embed="rId3"/>
+          <a:stretch>
+            <a:fillRect/>
+          </a:stretch>
+        </p:blipFill>
+        <p:spPr>
+          <a:xfrm>
+            <a:off x="4935980" y="1415914"/>
+            <a:ext cx="7149340" cy="2647266"/>
+          </a:xfrm>
+          <a:prstGeom prst="round2DiagRect">
+            <a:avLst>
+              <a:gd name="adj1" fmla="val 16667"/>
+              <a:gd name="adj2" fmla="val 0"/>
+            </a:avLst>
+          </a:prstGeom>
+          <a:ln w="88900" cap="sq">
+            <a:solidFill>
+              <a:srgbClr val="FF6600"/>
+            </a:solidFill>
+            <a:miter lim="800000"/>
+          </a:ln>
+          <a:effectLst>
+            <a:outerShdw blurRad="254000" algn="tl" rotWithShape="0">
+              <a:srgbClr val="000000">
+                <a:alpha val="43000"/>
+              </a:srgbClr>
+            </a:outerShdw>
+          </a:effectLst>
+        </p:spPr>
+      </p:pic>
+      <p:pic>
+        <p:nvPicPr>
+          <p:cNvPr id="6" name="Picture 5">
+            <a:extLst>
+              <a:ext uri="{FF2B5EF4-FFF2-40B4-BE49-F238E27FC236}">
+                <a16:creationId xmlns:a16="http://schemas.microsoft.com/office/drawing/2014/main" id="{2BFF2129-2D56-A54A-5EDD-E17C71E92E58}"/>
+              </a:ext>
+            </a:extLst>
+          </p:cNvPr>
+          <p:cNvPicPr>
+            <a:picLocks noChangeAspect="1"/>
+          </p:cNvPicPr>
+          <p:nvPr/>
+        </p:nvPicPr>
+        <p:blipFill>
+          <a:blip r:embed="rId4"/>
+          <a:stretch>
+            <a:fillRect/>
+          </a:stretch>
+        </p:blipFill>
+        <p:spPr>
+          <a:xfrm>
+            <a:off x="445860" y="3642338"/>
+            <a:ext cx="4091456" cy="3079137"/>
+          </a:xfrm>
+          <a:prstGeom prst="round2DiagRect">
+            <a:avLst>
+              <a:gd name="adj1" fmla="val 16667"/>
+              <a:gd name="adj2" fmla="val 0"/>
+            </a:avLst>
+          </a:prstGeom>
+          <a:ln w="88900" cap="sq">
+            <a:solidFill>
+              <a:srgbClr val="FF6600"/>
+            </a:solidFill>
+            <a:miter lim="800000"/>
+          </a:ln>
+          <a:effectLst>
+            <a:outerShdw blurRad="254000" algn="tl" rotWithShape="0">
+              <a:srgbClr val="000000">
+                <a:alpha val="43000"/>
+              </a:srgbClr>
+            </a:outerShdw>
+          </a:effectLst>
+        </p:spPr>
+      </p:pic>
     </p:spTree>
     <p:extLst>
       <p:ext uri="{BB962C8B-B14F-4D97-AF65-F5344CB8AC3E}">
@@ -6460,6 +6552,52 @@
           </a:p>
         </p:txBody>
       </p:sp>
+      <p:pic>
+        <p:nvPicPr>
+          <p:cNvPr id="5" name="Picture 4">
+            <a:extLst>
+              <a:ext uri="{FF2B5EF4-FFF2-40B4-BE49-F238E27FC236}">
+                <a16:creationId xmlns:a16="http://schemas.microsoft.com/office/drawing/2014/main" id="{7CE16EAB-F0F2-B20C-B649-79DBAC7C8A66}"/>
+              </a:ext>
+            </a:extLst>
+          </p:cNvPr>
+          <p:cNvPicPr>
+            <a:picLocks noChangeAspect="1"/>
+          </p:cNvPicPr>
+          <p:nvPr/>
+        </p:nvPicPr>
+        <p:blipFill>
+          <a:blip r:embed="rId3"/>
+          <a:stretch>
+            <a:fillRect/>
+          </a:stretch>
+        </p:blipFill>
+        <p:spPr>
+          <a:xfrm>
+            <a:off x="5557519" y="3449844"/>
+            <a:ext cx="6450231" cy="3089068"/>
+          </a:xfrm>
+          <a:prstGeom prst="round2DiagRect">
+            <a:avLst>
+              <a:gd name="adj1" fmla="val 16667"/>
+              <a:gd name="adj2" fmla="val 0"/>
+            </a:avLst>
+          </a:prstGeom>
+          <a:ln w="88900" cap="sq">
+            <a:solidFill>
+              <a:srgbClr val="FF6600"/>
+            </a:solidFill>
+            <a:miter lim="800000"/>
+          </a:ln>
+          <a:effectLst>
+            <a:outerShdw blurRad="254000" algn="tl" rotWithShape="0">
+              <a:srgbClr val="000000">
+                <a:alpha val="43000"/>
+              </a:srgbClr>
+            </a:outerShdw>
+          </a:effectLst>
+        </p:spPr>
+      </p:pic>
     </p:spTree>
     <p:extLst>
       <p:ext uri="{BB962C8B-B14F-4D97-AF65-F5344CB8AC3E}">
@@ -6627,6 +6765,52 @@
           </a:p>
         </p:txBody>
       </p:sp>
+      <p:pic>
+        <p:nvPicPr>
+          <p:cNvPr id="5" name="Picture 4">
+            <a:extLst>
+              <a:ext uri="{FF2B5EF4-FFF2-40B4-BE49-F238E27FC236}">
+                <a16:creationId xmlns:a16="http://schemas.microsoft.com/office/drawing/2014/main" id="{5E5BBFD3-48DC-E8B6-DD6F-2C9343948D3D}"/>
+              </a:ext>
+            </a:extLst>
+          </p:cNvPr>
+          <p:cNvPicPr>
+            <a:picLocks noChangeAspect="1"/>
+          </p:cNvPicPr>
+          <p:nvPr/>
+        </p:nvPicPr>
+        <p:blipFill>
+          <a:blip r:embed="rId3"/>
+          <a:stretch>
+            <a:fillRect/>
+          </a:stretch>
+        </p:blipFill>
+        <p:spPr>
+          <a:xfrm>
+            <a:off x="4968240" y="3785728"/>
+            <a:ext cx="7000240" cy="2935747"/>
+          </a:xfrm>
+          <a:prstGeom prst="round2DiagRect">
+            <a:avLst>
+              <a:gd name="adj1" fmla="val 16667"/>
+              <a:gd name="adj2" fmla="val 0"/>
+            </a:avLst>
+          </a:prstGeom>
+          <a:ln w="88900" cap="sq">
+            <a:solidFill>
+              <a:srgbClr val="FF6600"/>
+            </a:solidFill>
+            <a:miter lim="800000"/>
+          </a:ln>
+          <a:effectLst>
+            <a:outerShdw blurRad="254000" algn="tl" rotWithShape="0">
+              <a:srgbClr val="000000">
+                <a:alpha val="43000"/>
+              </a:srgbClr>
+            </a:outerShdw>
+          </a:effectLst>
+        </p:spPr>
+      </p:pic>
     </p:spTree>
     <p:extLst>
       <p:ext uri="{BB962C8B-B14F-4D97-AF65-F5344CB8AC3E}">
@@ -6799,6 +6983,52 @@
           </a:p>
         </p:txBody>
       </p:sp>
+      <p:pic>
+        <p:nvPicPr>
+          <p:cNvPr id="5" name="Picture 4">
+            <a:extLst>
+              <a:ext uri="{FF2B5EF4-FFF2-40B4-BE49-F238E27FC236}">
+                <a16:creationId xmlns:a16="http://schemas.microsoft.com/office/drawing/2014/main" id="{401CBD60-935E-2ED3-6A6B-EF084B667787}"/>
+              </a:ext>
+            </a:extLst>
+          </p:cNvPr>
+          <p:cNvPicPr>
+            <a:picLocks noChangeAspect="1"/>
+          </p:cNvPicPr>
+          <p:nvPr/>
+        </p:nvPicPr>
+        <p:blipFill>
+          <a:blip r:embed="rId3"/>
+          <a:stretch>
+            <a:fillRect/>
+          </a:stretch>
+        </p:blipFill>
+        <p:spPr>
+          <a:xfrm>
+            <a:off x="2658003" y="1359575"/>
+            <a:ext cx="7324197" cy="5361613"/>
+          </a:xfrm>
+          <a:prstGeom prst="round2DiagRect">
+            <a:avLst>
+              <a:gd name="adj1" fmla="val 16667"/>
+              <a:gd name="adj2" fmla="val 0"/>
+            </a:avLst>
+          </a:prstGeom>
+          <a:ln w="88900" cap="sq">
+            <a:solidFill>
+              <a:srgbClr val="FF6600"/>
+            </a:solidFill>
+            <a:miter lim="800000"/>
+          </a:ln>
+          <a:effectLst>
+            <a:outerShdw blurRad="254000" algn="tl" rotWithShape="0">
+              <a:srgbClr val="000000">
+                <a:alpha val="43000"/>
+              </a:srgbClr>
+            </a:outerShdw>
+          </a:effectLst>
+        </p:spPr>
+      </p:pic>
     </p:spTree>
     <p:extLst>
       <p:ext uri="{BB962C8B-B14F-4D97-AF65-F5344CB8AC3E}">
@@ -6970,6 +7200,52 @@
           </a:p>
         </p:txBody>
       </p:sp>
+      <p:pic>
+        <p:nvPicPr>
+          <p:cNvPr id="5" name="Picture 4">
+            <a:extLst>
+              <a:ext uri="{FF2B5EF4-FFF2-40B4-BE49-F238E27FC236}">
+                <a16:creationId xmlns:a16="http://schemas.microsoft.com/office/drawing/2014/main" id="{3BF5D5CE-1DA0-4CD5-0835-CF051E805BEC}"/>
+              </a:ext>
+            </a:extLst>
+          </p:cNvPr>
+          <p:cNvPicPr>
+            <a:picLocks noChangeAspect="1"/>
+          </p:cNvPicPr>
+          <p:nvPr/>
+        </p:nvPicPr>
+        <p:blipFill>
+          <a:blip r:embed="rId3"/>
+          <a:stretch>
+            <a:fillRect/>
+          </a:stretch>
+        </p:blipFill>
+        <p:spPr>
+          <a:xfrm>
+            <a:off x="4780856" y="3124577"/>
+            <a:ext cx="7055544" cy="3095248"/>
+          </a:xfrm>
+          <a:prstGeom prst="round2DiagRect">
+            <a:avLst>
+              <a:gd name="adj1" fmla="val 16667"/>
+              <a:gd name="adj2" fmla="val 0"/>
+            </a:avLst>
+          </a:prstGeom>
+          <a:ln w="88900" cap="sq">
+            <a:solidFill>
+              <a:srgbClr val="FF6600"/>
+            </a:solidFill>
+            <a:miter lim="800000"/>
+          </a:ln>
+          <a:effectLst>
+            <a:outerShdw blurRad="254000" algn="tl" rotWithShape="0">
+              <a:srgbClr val="000000">
+                <a:alpha val="43000"/>
+              </a:srgbClr>
+            </a:outerShdw>
+          </a:effectLst>
+        </p:spPr>
+      </p:pic>
     </p:spTree>
     <p:extLst>
       <p:ext uri="{BB962C8B-B14F-4D97-AF65-F5344CB8AC3E}">
@@ -7141,6 +7417,52 @@
           </a:p>
         </p:txBody>
       </p:sp>
+      <p:pic>
+        <p:nvPicPr>
+          <p:cNvPr id="5" name="Picture 4">
+            <a:extLst>
+              <a:ext uri="{FF2B5EF4-FFF2-40B4-BE49-F238E27FC236}">
+                <a16:creationId xmlns:a16="http://schemas.microsoft.com/office/drawing/2014/main" id="{2516F206-27B9-A2A1-4ABE-A50525287B2D}"/>
+              </a:ext>
+            </a:extLst>
+          </p:cNvPr>
+          <p:cNvPicPr>
+            <a:picLocks noChangeAspect="1"/>
+          </p:cNvPicPr>
+          <p:nvPr/>
+        </p:nvPicPr>
+        <p:blipFill>
+          <a:blip r:embed="rId3"/>
+          <a:stretch>
+            <a:fillRect/>
+          </a:stretch>
+        </p:blipFill>
+        <p:spPr>
+          <a:xfrm>
+            <a:off x="4110085" y="1947132"/>
+            <a:ext cx="7243715" cy="4409218"/>
+          </a:xfrm>
+          <a:prstGeom prst="round2DiagRect">
+            <a:avLst>
+              <a:gd name="adj1" fmla="val 16667"/>
+              <a:gd name="adj2" fmla="val 0"/>
+            </a:avLst>
+          </a:prstGeom>
+          <a:ln w="88900" cap="sq">
+            <a:solidFill>
+              <a:srgbClr val="FF6600"/>
+            </a:solidFill>
+            <a:miter lim="800000"/>
+          </a:ln>
+          <a:effectLst>
+            <a:outerShdw blurRad="254000" algn="tl" rotWithShape="0">
+              <a:srgbClr val="000000">
+                <a:alpha val="43000"/>
+              </a:srgbClr>
+            </a:outerShdw>
+          </a:effectLst>
+        </p:spPr>
+      </p:pic>
     </p:spTree>
     <p:extLst>
       <p:ext uri="{BB962C8B-B14F-4D97-AF65-F5344CB8AC3E}">

</xml_diff>

<commit_message>
small tweaks to presentation
-added images
- small description changes
</commit_message>
<xml_diff>
--- a/Rust workshop presentation.pptx
+++ b/Rust workshop presentation.pptx
@@ -214,7 +214,7 @@
           <a:p>
             <a:fld id="{59746C06-FCD2-4F71-B216-407952C80BC0}" type="datetimeFigureOut">
               <a:rPr lang="en-US" smtClean="0"/>
-              <a:t>11/6/2025</a:t>
+              <a:t>11/12/2025</a:t>
             </a:fld>
             <a:endParaRPr lang="en-US"/>
           </a:p>
@@ -1450,12 +1450,12 @@
           </a:p>
           <a:p>
             <a:r>
-              <a:rPr lang="en-US"/>
+              <a:rPr lang="en-US" dirty="0"/>
               <a:t>Performance and safety combined without runtime overhead</a:t>
             </a:r>
           </a:p>
           <a:p>
-            <a:endParaRPr lang="en-US"/>
+            <a:endParaRPr lang="en-US" dirty="0"/>
           </a:p>
         </p:txBody>
       </p:sp>
@@ -3286,7 +3286,7 @@
           <a:p>
             <a:fld id="{7AE778D6-116B-42D4-B211-69FF968B1FB5}" type="datetime1">
               <a:rPr lang="en-US" smtClean="0"/>
-              <a:t>11/6/2025</a:t>
+              <a:t>11/12/2025</a:t>
             </a:fld>
             <a:endParaRPr lang="en-US"/>
           </a:p>
@@ -3484,7 +3484,7 @@
           <a:p>
             <a:fld id="{7E6DD9C0-0887-4597-9FA4-971B42BD2B7B}" type="datetime1">
               <a:rPr lang="en-US" smtClean="0"/>
-              <a:t>11/6/2025</a:t>
+              <a:t>11/12/2025</a:t>
             </a:fld>
             <a:endParaRPr lang="en-US"/>
           </a:p>
@@ -3692,7 +3692,7 @@
           <a:p>
             <a:fld id="{68CBAA00-04F6-4A64-8418-1CAF36238E74}" type="datetime1">
               <a:rPr lang="en-US" smtClean="0"/>
-              <a:t>11/6/2025</a:t>
+              <a:t>11/12/2025</a:t>
             </a:fld>
             <a:endParaRPr lang="en-US"/>
           </a:p>
@@ -3890,7 +3890,7 @@
           <a:p>
             <a:fld id="{A20B7C04-B98A-469A-A63D-29333B974FF0}" type="datetime1">
               <a:rPr lang="en-US" smtClean="0"/>
-              <a:t>11/6/2025</a:t>
+              <a:t>11/12/2025</a:t>
             </a:fld>
             <a:endParaRPr lang="en-US"/>
           </a:p>
@@ -4165,7 +4165,7 @@
           <a:p>
             <a:fld id="{D144AB39-089E-4DC2-9FD7-483334CC6F45}" type="datetime1">
               <a:rPr lang="en-US" smtClean="0"/>
-              <a:t>11/6/2025</a:t>
+              <a:t>11/12/2025</a:t>
             </a:fld>
             <a:endParaRPr lang="en-US"/>
           </a:p>
@@ -4430,7 +4430,7 @@
           <a:p>
             <a:fld id="{10FF1A6B-EBD6-486F-8482-790FCFEAC738}" type="datetime1">
               <a:rPr lang="en-US" smtClean="0"/>
-              <a:t>11/6/2025</a:t>
+              <a:t>11/12/2025</a:t>
             </a:fld>
             <a:endParaRPr lang="en-US"/>
           </a:p>
@@ -4842,7 +4842,7 @@
           <a:p>
             <a:fld id="{FB1891AC-55C6-4C05-A884-9CB1E0A310E6}" type="datetime1">
               <a:rPr lang="en-US" smtClean="0"/>
-              <a:t>11/6/2025</a:t>
+              <a:t>11/12/2025</a:t>
             </a:fld>
             <a:endParaRPr lang="en-US"/>
           </a:p>
@@ -4983,7 +4983,7 @@
           <a:p>
             <a:fld id="{DFDE8B63-F820-4FAD-81A2-E59676E7AC11}" type="datetime1">
               <a:rPr lang="en-US" smtClean="0"/>
-              <a:t>11/6/2025</a:t>
+              <a:t>11/12/2025</a:t>
             </a:fld>
             <a:endParaRPr lang="en-US"/>
           </a:p>
@@ -5096,7 +5096,7 @@
           <a:p>
             <a:fld id="{B16CBD63-D720-4FA5-9B2A-11A274B73B13}" type="datetime1">
               <a:rPr lang="en-US" smtClean="0"/>
-              <a:t>11/6/2025</a:t>
+              <a:t>11/12/2025</a:t>
             </a:fld>
             <a:endParaRPr lang="en-US"/>
           </a:p>
@@ -5407,7 +5407,7 @@
           <a:p>
             <a:fld id="{AE6DC516-42BC-4DA2-A67D-57F25C343610}" type="datetime1">
               <a:rPr lang="en-US" smtClean="0"/>
-              <a:t>11/6/2025</a:t>
+              <a:t>11/12/2025</a:t>
             </a:fld>
             <a:endParaRPr lang="en-US"/>
           </a:p>
@@ -5695,7 +5695,7 @@
           <a:p>
             <a:fld id="{057FCABE-86A5-44BB-A17E-3066E7620E0A}" type="datetime1">
               <a:rPr lang="en-US" smtClean="0"/>
-              <a:t>11/6/2025</a:t>
+              <a:t>11/12/2025</a:t>
             </a:fld>
             <a:endParaRPr lang="en-US"/>
           </a:p>
@@ -5936,7 +5936,7 @@
           <a:p>
             <a:fld id="{853198DE-BE31-40FF-B292-54C23C33BE6A}" type="datetime1">
               <a:rPr lang="en-US" smtClean="0"/>
-              <a:t>11/6/2025</a:t>
+              <a:t>11/12/2025</a:t>
             </a:fld>
             <a:endParaRPr lang="en-US"/>
           </a:p>
@@ -7420,8 +7420,8 @@
         </p:blipFill>
         <p:spPr>
           <a:xfrm>
-            <a:off x="2130006" y="2232727"/>
-            <a:ext cx="8325392" cy="3987098"/>
+            <a:off x="737488" y="2899375"/>
+            <a:ext cx="7599656" cy="3639537"/>
           </a:xfrm>
           <a:prstGeom prst="round2DiagRect">
             <a:avLst>
@@ -7442,6 +7442,36 @@
               </a:srgbClr>
             </a:outerShdw>
           </a:effectLst>
+        </p:spPr>
+      </p:pic>
+      <p:pic>
+        <p:nvPicPr>
+          <p:cNvPr id="7" name="Picture 6">
+            <a:extLst>
+              <a:ext uri="{FF2B5EF4-FFF2-40B4-BE49-F238E27FC236}">
+                <a16:creationId xmlns:a16="http://schemas.microsoft.com/office/drawing/2014/main" id="{2F7AF080-9043-A8BD-FF81-00324C1A9AFE}"/>
+              </a:ext>
+            </a:extLst>
+          </p:cNvPr>
+          <p:cNvPicPr>
+            <a:picLocks noChangeAspect="1"/>
+          </p:cNvPicPr>
+          <p:nvPr/>
+        </p:nvPicPr>
+        <p:blipFill>
+          <a:blip r:embed="rId5"/>
+          <a:stretch>
+            <a:fillRect/>
+          </a:stretch>
+        </p:blipFill>
+        <p:spPr>
+          <a:xfrm>
+            <a:off x="6095047" y="1268361"/>
+            <a:ext cx="5801535" cy="1524213"/>
+          </a:xfrm>
+          <a:prstGeom prst="rect">
+            <a:avLst/>
+          </a:prstGeom>
         </p:spPr>
       </p:pic>
     </p:spTree>
@@ -7851,7 +7881,7 @@
         </p:blipFill>
         <p:spPr>
           <a:xfrm>
-            <a:off x="2658003" y="1359575"/>
+            <a:off x="1621947" y="1341940"/>
             <a:ext cx="7324197" cy="5361613"/>
           </a:xfrm>
           <a:prstGeom prst="round2DiagRect">
@@ -7873,6 +7903,53 @@
               </a:srgbClr>
             </a:outerShdw>
           </a:effectLst>
+        </p:spPr>
+      </p:pic>
+      <p:pic>
+        <p:nvPicPr>
+          <p:cNvPr id="1032" name="Picture 8" descr="Error Icon SVG Vector &amp; PNG Free Download | UXWing">
+            <a:extLst>
+              <a:ext uri="{FF2B5EF4-FFF2-40B4-BE49-F238E27FC236}">
+                <a16:creationId xmlns:a16="http://schemas.microsoft.com/office/drawing/2014/main" id="{C274813D-3B5F-9DE9-E455-7329CB8DEE52}"/>
+              </a:ext>
+            </a:extLst>
+          </p:cNvPr>
+          <p:cNvPicPr>
+            <a:picLocks noChangeAspect="1" noChangeArrowheads="1"/>
+          </p:cNvPicPr>
+          <p:nvPr/>
+        </p:nvPicPr>
+        <p:blipFill>
+          <a:blip r:embed="rId5">
+            <a:extLst>
+              <a:ext uri="{28A0092B-C50C-407E-A947-70E740481C1C}">
+                <a14:useLocalDpi xmlns:a14="http://schemas.microsoft.com/office/drawing/2010/main" val="0"/>
+              </a:ext>
+            </a:extLst>
+          </a:blip>
+          <a:srcRect/>
+          <a:stretch>
+            <a:fillRect/>
+          </a:stretch>
+        </p:blipFill>
+        <p:spPr bwMode="auto">
+          <a:xfrm>
+            <a:off x="9118638" y="106718"/>
+            <a:ext cx="3071457" cy="3071457"/>
+          </a:xfrm>
+          <a:prstGeom prst="rect">
+            <a:avLst/>
+          </a:prstGeom>
+          <a:noFill/>
+          <a:extLst>
+            <a:ext uri="{909E8E84-426E-40DD-AFC4-6F175D3DCCD1}">
+              <a14:hiddenFill xmlns:a14="http://schemas.microsoft.com/office/drawing/2010/main">
+                <a:solidFill>
+                  <a:srgbClr val="FFFFFF"/>
+                </a:solidFill>
+              </a14:hiddenFill>
+            </a:ext>
+          </a:extLst>
         </p:spPr>
       </p:pic>
     </p:spTree>

</xml_diff>